<commit_message>
update video and split into two parts
</commit_message>
<xml_diff>
--- a/坚持.pptx
+++ b/坚持.pptx
@@ -5,25 +5,26 @@
     <p:sldMasterId id="2147483648" r:id="rId1"/>
   </p:sldMasterIdLst>
   <p:notesMasterIdLst>
-    <p:notesMasterId r:id="rId16"/>
+    <p:notesMasterId r:id="rId17"/>
   </p:notesMasterIdLst>
   <p:handoutMasterIdLst>
-    <p:handoutMasterId r:id="rId17"/>
+    <p:handoutMasterId r:id="rId18"/>
   </p:handoutMasterIdLst>
   <p:sldIdLst>
     <p:sldId id="256" r:id="rId3"/>
     <p:sldId id="257" r:id="rId4"/>
     <p:sldId id="269" r:id="rId5"/>
     <p:sldId id="270" r:id="rId6"/>
-    <p:sldId id="268" r:id="rId7"/>
-    <p:sldId id="275" r:id="rId8"/>
-    <p:sldId id="259" r:id="rId9"/>
-    <p:sldId id="261" r:id="rId10"/>
-    <p:sldId id="280" r:id="rId11"/>
-    <p:sldId id="281" r:id="rId12"/>
-    <p:sldId id="282" r:id="rId13"/>
-    <p:sldId id="277" r:id="rId14"/>
-    <p:sldId id="278" r:id="rId15"/>
+    <p:sldId id="287" r:id="rId7"/>
+    <p:sldId id="286" r:id="rId8"/>
+    <p:sldId id="268" r:id="rId9"/>
+    <p:sldId id="275" r:id="rId10"/>
+    <p:sldId id="259" r:id="rId11"/>
+    <p:sldId id="261" r:id="rId12"/>
+    <p:sldId id="280" r:id="rId13"/>
+    <p:sldId id="285" r:id="rId14"/>
+    <p:sldId id="277" r:id="rId15"/>
+    <p:sldId id="278" r:id="rId16"/>
   </p:sldIdLst>
   <p:sldSz cx="12192000" cy="6858000"/>
   <p:notesSz cx="7103745" cy="10234295"/>
@@ -137,6 +138,12 @@
             <p14:sldId id="270"/>
           </p14:sldIdLst>
         </p14:section>
+        <p14:section name="第一个视频" id="{6693e550-bd99-4fc5-9b93-c1ccc593b92e}">
+          <p14:sldIdLst>
+            <p14:sldId id="287"/>
+            <p14:sldId id="286"/>
+          </p14:sldIdLst>
+        </p14:section>
         <p14:section name="游戏" id="{31574325-10de-4d02-82e4-eb85caf11fd1}">
           <p14:sldIdLst>
             <p14:sldId id="268"/>
@@ -152,8 +159,7 @@
         <p14:section name="过渡-视频" id="{f2f1e13f-c0da-4da0-874b-5e20686398ee}">
           <p14:sldIdLst>
             <p14:sldId id="280"/>
-            <p14:sldId id="281"/>
-            <p14:sldId id="282"/>
+            <p14:sldId id="285"/>
           </p14:sldIdLst>
         </p14:section>
         <p14:section name="分享+卢灌鸡汤" id="{afe18866-15f7-42d7-9226-cd0032636a3b}">
@@ -3841,6 +3847,1012 @@
         <p:nvPr/>
       </p:nvGrpSpPr>
       <p:grpSpPr/>
+      <p:sp>
+        <p:nvSpPr>
+          <p:cNvPr id="5" name="Text Box 4"/>
+          <p:cNvSpPr txBox="true"/>
+          <p:nvPr/>
+        </p:nvSpPr>
+        <p:spPr>
+          <a:xfrm>
+            <a:off x="1099185" y="675005"/>
+            <a:ext cx="9993630" cy="5507990"/>
+          </a:xfrm>
+          <a:prstGeom prst="rect">
+            <a:avLst/>
+          </a:prstGeom>
+          <a:noFill/>
+        </p:spPr>
+        <p:txBody>
+          <a:bodyPr wrap="square" rtlCol="0">
+            <a:spAutoFit/>
+          </a:bodyPr>
+          <a:p>
+            <a:r>
+              <a:rPr lang="zh-CN" altLang="en-US" sz="3200">
+                <a:solidFill>
+                  <a:schemeClr val="accent1">
+                    <a:lumMod val="50000"/>
+                  </a:schemeClr>
+                </a:solidFill>
+              </a:rPr>
+              <a:t>狄更斯特别注意描写生活在英国社会底层的“小人物”的生活遭遇，体验生活，不管刮风下雨，每天都坚持去观察、谛听，记录下行人的零言碎语，积累了丰富的生活资料。</a:t>
+            </a:r>
+            <a:endParaRPr lang="zh-CN" altLang="en-US" sz="3200">
+              <a:solidFill>
+                <a:schemeClr val="accent1">
+                  <a:lumMod val="50000"/>
+                </a:schemeClr>
+              </a:solidFill>
+            </a:endParaRPr>
+          </a:p>
+          <a:p>
+            <a:r>
+              <a:rPr lang="zh-CN" altLang="en-US" sz="3200">
+                <a:solidFill>
+                  <a:schemeClr val="accent1">
+                    <a:lumMod val="50000"/>
+                  </a:schemeClr>
+                </a:solidFill>
+              </a:rPr>
+              <a:t>因此，他在《大卫</a:t>
+            </a:r>
+            <a:r>
+              <a:rPr lang="en-US" sz="3200">
+                <a:solidFill>
+                  <a:schemeClr val="accent1">
+                    <a:lumMod val="50000"/>
+                  </a:schemeClr>
+                </a:solidFill>
+                <a:sym typeface="+mn-ea"/>
+              </a:rPr>
+              <a:t>·</a:t>
+            </a:r>
+            <a:r>
+              <a:rPr lang="zh-CN" altLang="en-US" sz="3200">
+                <a:solidFill>
+                  <a:schemeClr val="accent1">
+                    <a:lumMod val="50000"/>
+                  </a:schemeClr>
+                </a:solidFill>
+              </a:rPr>
+              <a:t>科波菲尔》中写下精彩的人物描写对话，在《双城记》中留下逼真的社会背景描写，从而成为英国一代文豪，取得了他文学事业上的巨大成功。</a:t>
+            </a:r>
+            <a:endParaRPr lang="zh-CN" altLang="en-US" sz="3200">
+              <a:solidFill>
+                <a:schemeClr val="accent1">
+                  <a:lumMod val="50000"/>
+                </a:schemeClr>
+              </a:solidFill>
+            </a:endParaRPr>
+          </a:p>
+          <a:p>
+            <a:endParaRPr lang="zh-CN" altLang="en-US" sz="3200">
+              <a:solidFill>
+                <a:schemeClr val="accent1">
+                  <a:lumMod val="50000"/>
+                </a:schemeClr>
+              </a:solidFill>
+            </a:endParaRPr>
+          </a:p>
+          <a:p>
+            <a:r>
+              <a:rPr lang="zh-CN" altLang="en-US" sz="3200">
+                <a:solidFill>
+                  <a:schemeClr val="accent1">
+                    <a:lumMod val="50000"/>
+                  </a:schemeClr>
+                </a:solidFill>
+              </a:rPr>
+              <a:t>他的作品深刻地反映了当时英国复杂的社会现实，为英国批判现实主义文学的开拓和发展做出了卓越的贡献。他的作品对英国文学发展起到了深远的影响。</a:t>
+            </a:r>
+            <a:endParaRPr lang="zh-CN" altLang="en-US" sz="3200">
+              <a:solidFill>
+                <a:schemeClr val="accent1">
+                  <a:lumMod val="50000"/>
+                </a:schemeClr>
+              </a:solidFill>
+            </a:endParaRPr>
+          </a:p>
+        </p:txBody>
+      </p:sp>
+    </p:spTree>
+  </p:cSld>
+  <p:clrMapOvr>
+    <a:masterClrMapping/>
+  </p:clrMapOvr>
+  <p:transition>
+    <p:fade/>
+  </p:transition>
+</p:sld>
+</file>
+
+<file path=ppt/slides/slide11.xml><?xml version="1.0" encoding="utf-8"?>
+<p:sld xmlns:a="http://schemas.openxmlformats.org/drawingml/2006/main" xmlns:r="http://schemas.openxmlformats.org/officeDocument/2006/relationships" xmlns:p="http://schemas.openxmlformats.org/presentationml/2006/main">
+  <p:cSld>
+    <p:spTree>
+      <p:nvGrpSpPr>
+        <p:cNvPr id="1" name=""/>
+        <p:cNvGrpSpPr/>
+        <p:nvPr/>
+      </p:nvGrpSpPr>
+      <p:grpSpPr/>
+      <p:sp>
+        <p:nvSpPr>
+          <p:cNvPr id="4" name="Text Box 3"/>
+          <p:cNvSpPr txBox="true"/>
+          <p:nvPr/>
+        </p:nvSpPr>
+        <p:spPr>
+          <a:xfrm>
+            <a:off x="529590" y="336550"/>
+            <a:ext cx="11132820" cy="6185535"/>
+          </a:xfrm>
+          <a:prstGeom prst="rect">
+            <a:avLst/>
+          </a:prstGeom>
+          <a:noFill/>
+        </p:spPr>
+        <p:txBody>
+          <a:bodyPr wrap="square" rtlCol="0">
+            <a:spAutoFit/>
+          </a:bodyPr>
+          <a:p>
+            <a:r>
+              <a:rPr lang="zh-CN" altLang="en-US" sz="3600">
+                <a:solidFill>
+                  <a:schemeClr val="accent1">
+                    <a:lumMod val="50000"/>
+                  </a:schemeClr>
+                </a:solidFill>
+              </a:rPr>
+              <a:t>可是你知道自己应该怎么做吗？</a:t>
+            </a:r>
+            <a:endParaRPr lang="zh-CN" altLang="en-US" sz="3600">
+              <a:solidFill>
+                <a:schemeClr val="accent1">
+                  <a:lumMod val="50000"/>
+                </a:schemeClr>
+              </a:solidFill>
+            </a:endParaRPr>
+          </a:p>
+          <a:p>
+            <a:r>
+              <a:rPr lang="zh-CN" altLang="" sz="3600">
+                <a:solidFill>
+                  <a:schemeClr val="accent1">
+                    <a:lumMod val="50000"/>
+                  </a:schemeClr>
+                </a:solidFill>
+              </a:rPr>
+              <a:t>你知道吗？</a:t>
+            </a:r>
+            <a:endParaRPr lang="zh-CN" altLang="" sz="3600">
+              <a:solidFill>
+                <a:schemeClr val="accent1">
+                  <a:lumMod val="50000"/>
+                </a:schemeClr>
+              </a:solidFill>
+            </a:endParaRPr>
+          </a:p>
+          <a:p>
+            <a:r>
+              <a:rPr lang="zh-CN" altLang="" sz="3600">
+                <a:solidFill>
+                  <a:schemeClr val="accent1">
+                    <a:lumMod val="50000"/>
+                  </a:schemeClr>
+                </a:solidFill>
+              </a:rPr>
+              <a:t>你可能说我坚持过，可是我放都不是弃了</a:t>
+            </a:r>
+            <a:endParaRPr lang="zh-CN" altLang="" sz="3600">
+              <a:solidFill>
+                <a:schemeClr val="accent1">
+                  <a:lumMod val="50000"/>
+                </a:schemeClr>
+              </a:solidFill>
+            </a:endParaRPr>
+          </a:p>
+          <a:p>
+            <a:r>
+              <a:rPr lang="zh-CN" altLang="" sz="3600">
+                <a:solidFill>
+                  <a:schemeClr val="accent1">
+                    <a:lumMod val="50000"/>
+                  </a:schemeClr>
+                </a:solidFill>
+              </a:rPr>
+              <a:t>那这，还叫坚持吗？</a:t>
+            </a:r>
+            <a:endParaRPr lang="zh-CN" altLang="" sz="3600">
+              <a:solidFill>
+                <a:schemeClr val="accent1">
+                  <a:lumMod val="50000"/>
+                </a:schemeClr>
+              </a:solidFill>
+            </a:endParaRPr>
+          </a:p>
+          <a:p>
+            <a:r>
+              <a:rPr lang="zh-CN" altLang="" sz="3600">
+                <a:solidFill>
+                  <a:schemeClr val="accent1">
+                    <a:lumMod val="50000"/>
+                  </a:schemeClr>
+                </a:solidFill>
+              </a:rPr>
+              <a:t>不，这不是，这不叫坚持</a:t>
+            </a:r>
+            <a:endParaRPr lang="zh-CN" altLang="" sz="3600">
+              <a:solidFill>
+                <a:schemeClr val="accent1">
+                  <a:lumMod val="50000"/>
+                </a:schemeClr>
+              </a:solidFill>
+            </a:endParaRPr>
+          </a:p>
+          <a:p>
+            <a:r>
+              <a:rPr lang="zh-CN" altLang="" sz="3600">
+                <a:solidFill>
+                  <a:schemeClr val="accent1">
+                    <a:lumMod val="50000"/>
+                  </a:schemeClr>
+                </a:solidFill>
+              </a:rPr>
+              <a:t>坚持，坚持是什么，</a:t>
+            </a:r>
+            <a:endParaRPr lang="zh-CN" altLang="" sz="3600">
+              <a:solidFill>
+                <a:schemeClr val="accent1">
+                  <a:lumMod val="50000"/>
+                </a:schemeClr>
+              </a:solidFill>
+            </a:endParaRPr>
+          </a:p>
+          <a:p>
+            <a:r>
+              <a:rPr lang="zh-CN" altLang="" sz="3600">
+                <a:solidFill>
+                  <a:schemeClr val="accent1">
+                    <a:lumMod val="50000"/>
+                  </a:schemeClr>
+                </a:solidFill>
+              </a:rPr>
+              <a:t>坚持是无论发生什么，</a:t>
+            </a:r>
+            <a:endParaRPr lang="zh-CN" altLang="" sz="3600">
+              <a:solidFill>
+                <a:schemeClr val="accent1">
+                  <a:lumMod val="50000"/>
+                </a:schemeClr>
+              </a:solidFill>
+            </a:endParaRPr>
+          </a:p>
+          <a:p>
+            <a:r>
+              <a:rPr lang="zh-CN" altLang="" sz="3600">
+                <a:solidFill>
+                  <a:schemeClr val="accent1">
+                    <a:lumMod val="50000"/>
+                  </a:schemeClr>
+                </a:solidFill>
+              </a:rPr>
+              <a:t>都不会成为你不坚持的理由，</a:t>
+            </a:r>
+            <a:endParaRPr lang="zh-CN" altLang="" sz="3600">
+              <a:solidFill>
+                <a:schemeClr val="accent1">
+                  <a:lumMod val="50000"/>
+                </a:schemeClr>
+              </a:solidFill>
+            </a:endParaRPr>
+          </a:p>
+          <a:p>
+            <a:r>
+              <a:rPr lang="zh-CN" altLang="" sz="3600">
+                <a:solidFill>
+                  <a:schemeClr val="accent1">
+                    <a:lumMod val="50000"/>
+                  </a:schemeClr>
+                </a:solidFill>
+              </a:rPr>
+              <a:t>都不会成为你逃避的理由，</a:t>
+            </a:r>
+            <a:endParaRPr lang="zh-CN" altLang="" sz="3600">
+              <a:solidFill>
+                <a:schemeClr val="accent1">
+                  <a:lumMod val="50000"/>
+                </a:schemeClr>
+              </a:solidFill>
+            </a:endParaRPr>
+          </a:p>
+          <a:p>
+            <a:r>
+              <a:rPr lang="zh-CN" altLang="" sz="3600">
+                <a:solidFill>
+                  <a:schemeClr val="accent1">
+                    <a:lumMod val="50000"/>
+                  </a:schemeClr>
+                </a:solidFill>
+              </a:rPr>
+              <a:t>是一件，唯一一件你要从开始，做到结束，</a:t>
+            </a:r>
+            <a:endParaRPr lang="zh-CN" altLang="" sz="3600">
+              <a:solidFill>
+                <a:schemeClr val="accent1">
+                  <a:lumMod val="50000"/>
+                </a:schemeClr>
+              </a:solidFill>
+            </a:endParaRPr>
+          </a:p>
+          <a:p>
+            <a:r>
+              <a:rPr lang="zh-CN" altLang="" sz="3600">
+                <a:solidFill>
+                  <a:schemeClr val="accent1">
+                    <a:lumMod val="50000"/>
+                  </a:schemeClr>
+                </a:solidFill>
+              </a:rPr>
+              <a:t>没有停止过，没有放弃过</a:t>
+            </a:r>
+            <a:r>
+              <a:rPr lang="" altLang="zh-CN" sz="3600">
+                <a:solidFill>
+                  <a:schemeClr val="accent1">
+                    <a:lumMod val="50000"/>
+                  </a:schemeClr>
+                </a:solidFill>
+              </a:rPr>
+              <a:t>......</a:t>
+            </a:r>
+            <a:endParaRPr lang="" altLang="zh-CN" sz="3600">
+              <a:solidFill>
+                <a:schemeClr val="accent1">
+                  <a:lumMod val="50000"/>
+                </a:schemeClr>
+              </a:solidFill>
+            </a:endParaRPr>
+          </a:p>
+        </p:txBody>
+      </p:sp>
+    </p:spTree>
+  </p:cSld>
+  <p:clrMapOvr>
+    <a:masterClrMapping/>
+  </p:clrMapOvr>
+  <p:transition>
+    <p:fade/>
+  </p:transition>
+  <p:timing>
+    <p:tnLst>
+      <p:par>
+        <p:cTn id="1" dur="indefinite" restart="never" nodeType="tmRoot">
+          <p:childTnLst>
+            <p:seq concurrent="1" nextAc="seek">
+              <p:cTn id="2" dur="indefinite" nodeType="mainSeq">
+                <p:childTnLst>
+                  <p:par>
+                    <p:cTn id="3" fill="hold">
+                      <p:stCondLst>
+                        <p:cond delay="indefinite"/>
+                        <p:cond evt="onBegin" delay="0">
+                          <p:tn val="2"/>
+                        </p:cond>
+                      </p:stCondLst>
+                      <p:childTnLst>
+                        <p:par>
+                          <p:cTn id="4" fill="hold">
+                            <p:stCondLst>
+                              <p:cond delay="0"/>
+                            </p:stCondLst>
+                            <p:childTnLst>
+                              <p:par>
+                                <p:cTn id="5" presetID="16" presetClass="entr" presetSubtype="42" fill="hold" nodeType="afterEffect">
+                                  <p:stCondLst>
+                                    <p:cond delay="0"/>
+                                  </p:stCondLst>
+                                  <p:childTnLst>
+                                    <p:set>
+                                      <p:cBhvr>
+                                        <p:cTn id="6" dur="1000" fill="hold">
+                                          <p:stCondLst>
+                                            <p:cond delay="0"/>
+                                          </p:stCondLst>
+                                        </p:cTn>
+                                        <p:tgtEl>
+                                          <p:spTgt spid="4">
+                                            <p:txEl>
+                                              <p:pRg st="0" end="0"/>
+                                            </p:txEl>
+                                          </p:spTgt>
+                                        </p:tgtEl>
+                                        <p:attrNameLst>
+                                          <p:attrName>style.visibility</p:attrName>
+                                        </p:attrNameLst>
+                                      </p:cBhvr>
+                                      <p:to>
+                                        <p:strVal val="visible"/>
+                                      </p:to>
+                                    </p:set>
+                                    <p:animEffect transition="in" filter="barn(outHorizontal)">
+                                      <p:cBhvr>
+                                        <p:cTn id="7" dur="1000"/>
+                                        <p:tgtEl>
+                                          <p:spTgt spid="4">
+                                            <p:txEl>
+                                              <p:pRg st="0" end="0"/>
+                                            </p:txEl>
+                                          </p:spTgt>
+                                        </p:tgtEl>
+                                      </p:cBhvr>
+                                    </p:animEffect>
+                                  </p:childTnLst>
+                                </p:cTn>
+                              </p:par>
+                            </p:childTnLst>
+                          </p:cTn>
+                        </p:par>
+                        <p:par>
+                          <p:cTn id="8" fill="hold">
+                            <p:stCondLst>
+                              <p:cond delay="1000"/>
+                            </p:stCondLst>
+                            <p:childTnLst>
+                              <p:par>
+                                <p:cTn id="9" presetID="16" presetClass="entr" presetSubtype="42" fill="hold" nodeType="afterEffect">
+                                  <p:stCondLst>
+                                    <p:cond delay="0"/>
+                                  </p:stCondLst>
+                                  <p:childTnLst>
+                                    <p:set>
+                                      <p:cBhvr>
+                                        <p:cTn id="10" dur="1000" fill="hold">
+                                          <p:stCondLst>
+                                            <p:cond delay="0"/>
+                                          </p:stCondLst>
+                                        </p:cTn>
+                                        <p:tgtEl>
+                                          <p:spTgt spid="4">
+                                            <p:txEl>
+                                              <p:pRg st="1" end="1"/>
+                                            </p:txEl>
+                                          </p:spTgt>
+                                        </p:tgtEl>
+                                        <p:attrNameLst>
+                                          <p:attrName>style.visibility</p:attrName>
+                                        </p:attrNameLst>
+                                      </p:cBhvr>
+                                      <p:to>
+                                        <p:strVal val="visible"/>
+                                      </p:to>
+                                    </p:set>
+                                    <p:animEffect transition="in" filter="barn(outHorizontal)">
+                                      <p:cBhvr>
+                                        <p:cTn id="11" dur="1000"/>
+                                        <p:tgtEl>
+                                          <p:spTgt spid="4">
+                                            <p:txEl>
+                                              <p:pRg st="1" end="1"/>
+                                            </p:txEl>
+                                          </p:spTgt>
+                                        </p:tgtEl>
+                                      </p:cBhvr>
+                                    </p:animEffect>
+                                  </p:childTnLst>
+                                </p:cTn>
+                              </p:par>
+                            </p:childTnLst>
+                          </p:cTn>
+                        </p:par>
+                        <p:par>
+                          <p:cTn id="12" fill="hold">
+                            <p:stCondLst>
+                              <p:cond delay="2000"/>
+                            </p:stCondLst>
+                            <p:childTnLst>
+                              <p:par>
+                                <p:cTn id="13" presetID="16" presetClass="entr" presetSubtype="42" fill="hold" nodeType="afterEffect">
+                                  <p:stCondLst>
+                                    <p:cond delay="0"/>
+                                  </p:stCondLst>
+                                  <p:childTnLst>
+                                    <p:set>
+                                      <p:cBhvr>
+                                        <p:cTn id="14" dur="1000" fill="hold">
+                                          <p:stCondLst>
+                                            <p:cond delay="0"/>
+                                          </p:stCondLst>
+                                        </p:cTn>
+                                        <p:tgtEl>
+                                          <p:spTgt spid="4">
+                                            <p:txEl>
+                                              <p:pRg st="2" end="2"/>
+                                            </p:txEl>
+                                          </p:spTgt>
+                                        </p:tgtEl>
+                                        <p:attrNameLst>
+                                          <p:attrName>style.visibility</p:attrName>
+                                        </p:attrNameLst>
+                                      </p:cBhvr>
+                                      <p:to>
+                                        <p:strVal val="visible"/>
+                                      </p:to>
+                                    </p:set>
+                                    <p:animEffect transition="in" filter="barn(outHorizontal)">
+                                      <p:cBhvr>
+                                        <p:cTn id="15" dur="1000"/>
+                                        <p:tgtEl>
+                                          <p:spTgt spid="4">
+                                            <p:txEl>
+                                              <p:pRg st="2" end="2"/>
+                                            </p:txEl>
+                                          </p:spTgt>
+                                        </p:tgtEl>
+                                      </p:cBhvr>
+                                    </p:animEffect>
+                                  </p:childTnLst>
+                                </p:cTn>
+                              </p:par>
+                            </p:childTnLst>
+                          </p:cTn>
+                        </p:par>
+                        <p:par>
+                          <p:cTn id="16" fill="hold">
+                            <p:stCondLst>
+                              <p:cond delay="3000"/>
+                            </p:stCondLst>
+                            <p:childTnLst>
+                              <p:par>
+                                <p:cTn id="17" presetID="16" presetClass="entr" presetSubtype="42" fill="hold" nodeType="afterEffect">
+                                  <p:stCondLst>
+                                    <p:cond delay="0"/>
+                                  </p:stCondLst>
+                                  <p:childTnLst>
+                                    <p:set>
+                                      <p:cBhvr>
+                                        <p:cTn id="18" dur="1000" fill="hold">
+                                          <p:stCondLst>
+                                            <p:cond delay="0"/>
+                                          </p:stCondLst>
+                                        </p:cTn>
+                                        <p:tgtEl>
+                                          <p:spTgt spid="4">
+                                            <p:txEl>
+                                              <p:pRg st="3" end="3"/>
+                                            </p:txEl>
+                                          </p:spTgt>
+                                        </p:tgtEl>
+                                        <p:attrNameLst>
+                                          <p:attrName>style.visibility</p:attrName>
+                                        </p:attrNameLst>
+                                      </p:cBhvr>
+                                      <p:to>
+                                        <p:strVal val="visible"/>
+                                      </p:to>
+                                    </p:set>
+                                    <p:animEffect transition="in" filter="barn(outHorizontal)">
+                                      <p:cBhvr>
+                                        <p:cTn id="19" dur="1000"/>
+                                        <p:tgtEl>
+                                          <p:spTgt spid="4">
+                                            <p:txEl>
+                                              <p:pRg st="3" end="3"/>
+                                            </p:txEl>
+                                          </p:spTgt>
+                                        </p:tgtEl>
+                                      </p:cBhvr>
+                                    </p:animEffect>
+                                  </p:childTnLst>
+                                </p:cTn>
+                              </p:par>
+                            </p:childTnLst>
+                          </p:cTn>
+                        </p:par>
+                        <p:par>
+                          <p:cTn id="20" fill="hold">
+                            <p:stCondLst>
+                              <p:cond delay="4000"/>
+                            </p:stCondLst>
+                            <p:childTnLst>
+                              <p:par>
+                                <p:cTn id="21" presetID="16" presetClass="entr" presetSubtype="42" fill="hold" nodeType="afterEffect">
+                                  <p:stCondLst>
+                                    <p:cond delay="0"/>
+                                  </p:stCondLst>
+                                  <p:childTnLst>
+                                    <p:set>
+                                      <p:cBhvr>
+                                        <p:cTn id="22" dur="1000" fill="hold">
+                                          <p:stCondLst>
+                                            <p:cond delay="0"/>
+                                          </p:stCondLst>
+                                        </p:cTn>
+                                        <p:tgtEl>
+                                          <p:spTgt spid="4">
+                                            <p:txEl>
+                                              <p:pRg st="4" end="4"/>
+                                            </p:txEl>
+                                          </p:spTgt>
+                                        </p:tgtEl>
+                                        <p:attrNameLst>
+                                          <p:attrName>style.visibility</p:attrName>
+                                        </p:attrNameLst>
+                                      </p:cBhvr>
+                                      <p:to>
+                                        <p:strVal val="visible"/>
+                                      </p:to>
+                                    </p:set>
+                                    <p:animEffect transition="in" filter="barn(outHorizontal)">
+                                      <p:cBhvr>
+                                        <p:cTn id="23" dur="1000"/>
+                                        <p:tgtEl>
+                                          <p:spTgt spid="4">
+                                            <p:txEl>
+                                              <p:pRg st="4" end="4"/>
+                                            </p:txEl>
+                                          </p:spTgt>
+                                        </p:tgtEl>
+                                      </p:cBhvr>
+                                    </p:animEffect>
+                                  </p:childTnLst>
+                                </p:cTn>
+                              </p:par>
+                            </p:childTnLst>
+                          </p:cTn>
+                        </p:par>
+                        <p:par>
+                          <p:cTn id="24" fill="hold">
+                            <p:stCondLst>
+                              <p:cond delay="5000"/>
+                            </p:stCondLst>
+                            <p:childTnLst>
+                              <p:par>
+                                <p:cTn id="25" presetID="16" presetClass="entr" presetSubtype="42" fill="hold" nodeType="afterEffect">
+                                  <p:stCondLst>
+                                    <p:cond delay="0"/>
+                                  </p:stCondLst>
+                                  <p:childTnLst>
+                                    <p:set>
+                                      <p:cBhvr>
+                                        <p:cTn id="26" dur="1000" fill="hold">
+                                          <p:stCondLst>
+                                            <p:cond delay="0"/>
+                                          </p:stCondLst>
+                                        </p:cTn>
+                                        <p:tgtEl>
+                                          <p:spTgt spid="4">
+                                            <p:txEl>
+                                              <p:pRg st="5" end="5"/>
+                                            </p:txEl>
+                                          </p:spTgt>
+                                        </p:tgtEl>
+                                        <p:attrNameLst>
+                                          <p:attrName>style.visibility</p:attrName>
+                                        </p:attrNameLst>
+                                      </p:cBhvr>
+                                      <p:to>
+                                        <p:strVal val="visible"/>
+                                      </p:to>
+                                    </p:set>
+                                    <p:animEffect transition="in" filter="barn(outHorizontal)">
+                                      <p:cBhvr>
+                                        <p:cTn id="27" dur="1000"/>
+                                        <p:tgtEl>
+                                          <p:spTgt spid="4">
+                                            <p:txEl>
+                                              <p:pRg st="5" end="5"/>
+                                            </p:txEl>
+                                          </p:spTgt>
+                                        </p:tgtEl>
+                                      </p:cBhvr>
+                                    </p:animEffect>
+                                  </p:childTnLst>
+                                </p:cTn>
+                              </p:par>
+                            </p:childTnLst>
+                          </p:cTn>
+                        </p:par>
+                        <p:par>
+                          <p:cTn id="28" fill="hold">
+                            <p:stCondLst>
+                              <p:cond delay="6000"/>
+                            </p:stCondLst>
+                            <p:childTnLst>
+                              <p:par>
+                                <p:cTn id="29" presetID="16" presetClass="entr" presetSubtype="42" fill="hold" nodeType="afterEffect">
+                                  <p:stCondLst>
+                                    <p:cond delay="0"/>
+                                  </p:stCondLst>
+                                  <p:childTnLst>
+                                    <p:set>
+                                      <p:cBhvr>
+                                        <p:cTn id="30" dur="500" fill="hold">
+                                          <p:stCondLst>
+                                            <p:cond delay="0"/>
+                                          </p:stCondLst>
+                                        </p:cTn>
+                                        <p:tgtEl>
+                                          <p:spTgt spid="4">
+                                            <p:txEl>
+                                              <p:pRg st="6" end="6"/>
+                                            </p:txEl>
+                                          </p:spTgt>
+                                        </p:tgtEl>
+                                        <p:attrNameLst>
+                                          <p:attrName>style.visibility</p:attrName>
+                                        </p:attrNameLst>
+                                      </p:cBhvr>
+                                      <p:to>
+                                        <p:strVal val="visible"/>
+                                      </p:to>
+                                    </p:set>
+                                    <p:animEffect transition="in" filter="barn(outHorizontal)">
+                                      <p:cBhvr>
+                                        <p:cTn id="31" dur="500"/>
+                                        <p:tgtEl>
+                                          <p:spTgt spid="4">
+                                            <p:txEl>
+                                              <p:pRg st="6" end="6"/>
+                                            </p:txEl>
+                                          </p:spTgt>
+                                        </p:tgtEl>
+                                      </p:cBhvr>
+                                    </p:animEffect>
+                                  </p:childTnLst>
+                                </p:cTn>
+                              </p:par>
+                            </p:childTnLst>
+                          </p:cTn>
+                        </p:par>
+                        <p:par>
+                          <p:cTn id="32" fill="hold">
+                            <p:stCondLst>
+                              <p:cond delay="6500"/>
+                            </p:stCondLst>
+                            <p:childTnLst>
+                              <p:par>
+                                <p:cTn id="33" presetID="16" presetClass="entr" presetSubtype="42" fill="hold" nodeType="afterEffect">
+                                  <p:stCondLst>
+                                    <p:cond delay="0"/>
+                                  </p:stCondLst>
+                                  <p:childTnLst>
+                                    <p:set>
+                                      <p:cBhvr>
+                                        <p:cTn id="34" dur="1000" fill="hold">
+                                          <p:stCondLst>
+                                            <p:cond delay="0"/>
+                                          </p:stCondLst>
+                                        </p:cTn>
+                                        <p:tgtEl>
+                                          <p:spTgt spid="4">
+                                            <p:txEl>
+                                              <p:pRg st="7" end="7"/>
+                                            </p:txEl>
+                                          </p:spTgt>
+                                        </p:tgtEl>
+                                        <p:attrNameLst>
+                                          <p:attrName>style.visibility</p:attrName>
+                                        </p:attrNameLst>
+                                      </p:cBhvr>
+                                      <p:to>
+                                        <p:strVal val="visible"/>
+                                      </p:to>
+                                    </p:set>
+                                    <p:animEffect transition="in" filter="barn(outHorizontal)">
+                                      <p:cBhvr>
+                                        <p:cTn id="35" dur="1000"/>
+                                        <p:tgtEl>
+                                          <p:spTgt spid="4">
+                                            <p:txEl>
+                                              <p:pRg st="7" end="7"/>
+                                            </p:txEl>
+                                          </p:spTgt>
+                                        </p:tgtEl>
+                                      </p:cBhvr>
+                                    </p:animEffect>
+                                  </p:childTnLst>
+                                </p:cTn>
+                              </p:par>
+                            </p:childTnLst>
+                          </p:cTn>
+                        </p:par>
+                        <p:par>
+                          <p:cTn id="36" fill="hold">
+                            <p:stCondLst>
+                              <p:cond delay="7500"/>
+                            </p:stCondLst>
+                            <p:childTnLst>
+                              <p:par>
+                                <p:cTn id="37" presetID="16" presetClass="entr" presetSubtype="42" fill="hold" nodeType="afterEffect">
+                                  <p:stCondLst>
+                                    <p:cond delay="0"/>
+                                  </p:stCondLst>
+                                  <p:childTnLst>
+                                    <p:set>
+                                      <p:cBhvr>
+                                        <p:cTn id="38" dur="1000" fill="hold">
+                                          <p:stCondLst>
+                                            <p:cond delay="0"/>
+                                          </p:stCondLst>
+                                        </p:cTn>
+                                        <p:tgtEl>
+                                          <p:spTgt spid="4">
+                                            <p:txEl>
+                                              <p:pRg st="8" end="8"/>
+                                            </p:txEl>
+                                          </p:spTgt>
+                                        </p:tgtEl>
+                                        <p:attrNameLst>
+                                          <p:attrName>style.visibility</p:attrName>
+                                        </p:attrNameLst>
+                                      </p:cBhvr>
+                                      <p:to>
+                                        <p:strVal val="visible"/>
+                                      </p:to>
+                                    </p:set>
+                                    <p:animEffect transition="in" filter="barn(outHorizontal)">
+                                      <p:cBhvr>
+                                        <p:cTn id="39" dur="1000"/>
+                                        <p:tgtEl>
+                                          <p:spTgt spid="4">
+                                            <p:txEl>
+                                              <p:pRg st="8" end="8"/>
+                                            </p:txEl>
+                                          </p:spTgt>
+                                        </p:tgtEl>
+                                      </p:cBhvr>
+                                    </p:animEffect>
+                                  </p:childTnLst>
+                                </p:cTn>
+                              </p:par>
+                            </p:childTnLst>
+                          </p:cTn>
+                        </p:par>
+                        <p:par>
+                          <p:cTn id="40" fill="hold">
+                            <p:stCondLst>
+                              <p:cond delay="8500"/>
+                            </p:stCondLst>
+                            <p:childTnLst>
+                              <p:par>
+                                <p:cTn id="41" presetID="16" presetClass="entr" presetSubtype="42" fill="hold" nodeType="afterEffect">
+                                  <p:stCondLst>
+                                    <p:cond delay="0"/>
+                                  </p:stCondLst>
+                                  <p:childTnLst>
+                                    <p:set>
+                                      <p:cBhvr>
+                                        <p:cTn id="42" dur="1000" fill="hold">
+                                          <p:stCondLst>
+                                            <p:cond delay="0"/>
+                                          </p:stCondLst>
+                                        </p:cTn>
+                                        <p:tgtEl>
+                                          <p:spTgt spid="4">
+                                            <p:txEl>
+                                              <p:pRg st="9" end="9"/>
+                                            </p:txEl>
+                                          </p:spTgt>
+                                        </p:tgtEl>
+                                        <p:attrNameLst>
+                                          <p:attrName>style.visibility</p:attrName>
+                                        </p:attrNameLst>
+                                      </p:cBhvr>
+                                      <p:to>
+                                        <p:strVal val="visible"/>
+                                      </p:to>
+                                    </p:set>
+                                    <p:animEffect transition="in" filter="barn(outHorizontal)">
+                                      <p:cBhvr>
+                                        <p:cTn id="43" dur="1000"/>
+                                        <p:tgtEl>
+                                          <p:spTgt spid="4">
+                                            <p:txEl>
+                                              <p:pRg st="9" end="9"/>
+                                            </p:txEl>
+                                          </p:spTgt>
+                                        </p:tgtEl>
+                                      </p:cBhvr>
+                                    </p:animEffect>
+                                  </p:childTnLst>
+                                </p:cTn>
+                              </p:par>
+                            </p:childTnLst>
+                          </p:cTn>
+                        </p:par>
+                        <p:par>
+                          <p:cTn id="44" fill="hold">
+                            <p:stCondLst>
+                              <p:cond delay="9500"/>
+                            </p:stCondLst>
+                            <p:childTnLst>
+                              <p:par>
+                                <p:cTn id="45" presetID="16" presetClass="entr" presetSubtype="42" fill="hold" nodeType="afterEffect">
+                                  <p:stCondLst>
+                                    <p:cond delay="0"/>
+                                  </p:stCondLst>
+                                  <p:childTnLst>
+                                    <p:set>
+                                      <p:cBhvr>
+                                        <p:cTn id="46" dur="1000" fill="hold">
+                                          <p:stCondLst>
+                                            <p:cond delay="0"/>
+                                          </p:stCondLst>
+                                        </p:cTn>
+                                        <p:tgtEl>
+                                          <p:spTgt spid="4">
+                                            <p:txEl>
+                                              <p:pRg st="10" end="10"/>
+                                            </p:txEl>
+                                          </p:spTgt>
+                                        </p:tgtEl>
+                                        <p:attrNameLst>
+                                          <p:attrName>style.visibility</p:attrName>
+                                        </p:attrNameLst>
+                                      </p:cBhvr>
+                                      <p:to>
+                                        <p:strVal val="visible"/>
+                                      </p:to>
+                                    </p:set>
+                                    <p:animEffect transition="in" filter="barn(outHorizontal)">
+                                      <p:cBhvr>
+                                        <p:cTn id="47" dur="1000"/>
+                                        <p:tgtEl>
+                                          <p:spTgt spid="4">
+                                            <p:txEl>
+                                              <p:pRg st="10" end="10"/>
+                                            </p:txEl>
+                                          </p:spTgt>
+                                        </p:tgtEl>
+                                      </p:cBhvr>
+                                    </p:animEffect>
+                                  </p:childTnLst>
+                                </p:cTn>
+                              </p:par>
+                            </p:childTnLst>
+                          </p:cTn>
+                        </p:par>
+                      </p:childTnLst>
+                    </p:cTn>
+                  </p:par>
+                </p:childTnLst>
+              </p:cTn>
+              <p:prevCondLst>
+                <p:cond evt="onPrev" delay="0">
+                  <p:tgtEl>
+                    <p:sldTgt/>
+                  </p:tgtEl>
+                </p:cond>
+              </p:prevCondLst>
+              <p:nextCondLst>
+                <p:cond evt="onNext" delay="0">
+                  <p:tgtEl>
+                    <p:sldTgt/>
+                  </p:tgtEl>
+                </p:cond>
+              </p:nextCondLst>
+            </p:seq>
+          </p:childTnLst>
+        </p:cTn>
+      </p:par>
+    </p:tnLst>
+  </p:timing>
+</p:sld>
+</file>
+
+<file path=ppt/slides/slide12.xml><?xml version="1.0" encoding="utf-8"?>
+<p:sld xmlns:a="http://schemas.openxmlformats.org/drawingml/2006/main" xmlns:r="http://schemas.openxmlformats.org/officeDocument/2006/relationships" xmlns:p="http://schemas.openxmlformats.org/presentationml/2006/main">
+  <p:cSld>
+    <p:spTree>
+      <p:nvGrpSpPr>
+        <p:cNvPr id="1" name=""/>
+        <p:cNvGrpSpPr/>
+        <p:nvPr/>
+      </p:nvGrpSpPr>
+      <p:grpSpPr/>
       <p:pic>
         <p:nvPicPr>
           <p:cNvPr id="4" name="坚持的视频">
@@ -3865,8 +4877,8 @@
         </p:blipFill>
         <p:spPr>
           <a:xfrm>
-            <a:off x="4297045" y="231140"/>
-            <a:ext cx="3597910" cy="6395720"/>
+            <a:off x="545465" y="266700"/>
+            <a:ext cx="10902950" cy="5996940"/>
           </a:xfrm>
           <a:prstGeom prst="rect">
             <a:avLst/>
@@ -3973,149 +4985,7 @@
 </p:sld>
 </file>
 
-<file path=ppt/slides/slide11.xml><?xml version="1.0" encoding="utf-8"?>
-<p:sld xmlns:a="http://schemas.openxmlformats.org/drawingml/2006/main" xmlns:r="http://schemas.openxmlformats.org/officeDocument/2006/relationships" xmlns:p="http://schemas.openxmlformats.org/presentationml/2006/main">
-  <p:cSld>
-    <p:spTree>
-      <p:nvGrpSpPr>
-        <p:cNvPr id="1" name=""/>
-        <p:cNvGrpSpPr/>
-        <p:nvPr/>
-      </p:nvGrpSpPr>
-      <p:grpSpPr/>
-      <p:pic>
-        <p:nvPicPr>
-          <p:cNvPr id="4" name="坚持的不可能">
-            <a:hlinkClick r:id="" action="ppaction://media"/>
-          </p:cNvPr>
-          <p:cNvPicPr/>
-          <p:nvPr>
-            <p:ph idx="1"/>
-            <a:videoFile r:link="rId1"/>
-            <p:extLst>
-              <p:ext uri="{DAA4B4D4-6D71-4841-9C94-3DE7FCFB9230}">
-                <p14:media xmlns:p14="http://schemas.microsoft.com/office/powerpoint/2010/main" r:link="rId2"/>
-              </p:ext>
-            </p:extLst>
-          </p:nvPr>
-        </p:nvPicPr>
-        <p:blipFill>
-          <a:blip r:embed="rId3"/>
-          <a:stretch>
-            <a:fillRect/>
-          </a:stretch>
-        </p:blipFill>
-        <p:spPr>
-          <a:xfrm>
-            <a:off x="574040" y="668020"/>
-            <a:ext cx="11043920" cy="5522595"/>
-          </a:xfrm>
-          <a:prstGeom prst="rect">
-            <a:avLst/>
-          </a:prstGeom>
-        </p:spPr>
-      </p:pic>
-    </p:spTree>
-  </p:cSld>
-  <p:clrMapOvr>
-    <a:masterClrMapping/>
-  </p:clrMapOvr>
-  <p:timing>
-    <p:tnLst>
-      <p:par>
-        <p:cTn id="1" dur="indefinite" restart="never" nodeType="tmRoot">
-          <p:childTnLst>
-            <p:video fullScrn="false">
-              <p:cMediaNode>
-                <p:cTn id="2" fill="hold" display="1">
-                  <p:stCondLst>
-                    <p:cond delay="indefinite"/>
-                  </p:stCondLst>
-                  <p:endCondLst>
-                    <p:cond evt="onNext">
-                      <p:tgtEl>
-                        <p:sldTgt/>
-                      </p:tgtEl>
-                    </p:cond>
-                    <p:cond evt="onPrev">
-                      <p:tgtEl>
-                        <p:sldTgt/>
-                      </p:tgtEl>
-                    </p:cond>
-                  </p:endCondLst>
-                </p:cTn>
-                <p:tgtEl>
-                  <p:spTgt spid="4"/>
-                </p:tgtEl>
-              </p:cMediaNode>
-            </p:video>
-            <p:seq concurrent="1" nextAc="seek">
-              <p:cTn id="3" restart="whenNotActive" fill="hold" evtFilter="cancelBubble" nodeType="interactiveSeq">
-                <p:stCondLst>
-                  <p:cond evt="onClick" delay="0">
-                    <p:tgtEl>
-                      <p:spTgt spid="4"/>
-                    </p:tgtEl>
-                  </p:cond>
-                </p:stCondLst>
-                <p:endSync evt="end" delay="0">
-                  <p:rtn val="all"/>
-                </p:endSync>
-                <p:childTnLst>
-                  <p:par>
-                    <p:cTn id="4" fill="hold">
-                      <p:stCondLst>
-                        <p:cond delay="0"/>
-                      </p:stCondLst>
-                      <p:childTnLst>
-                        <p:par>
-                          <p:cTn id="5" fill="hold">
-                            <p:stCondLst>
-                              <p:cond delay="0"/>
-                            </p:stCondLst>
-                            <p:childTnLst>
-                              <p:par>
-                                <p:cTn id="6" presetID="2" presetClass="mediacall" presetSubtype="0" fill="hold" nodeType="clickEffect">
-                                  <p:stCondLst>
-                                    <p:cond delay="0"/>
-                                  </p:stCondLst>
-                                  <p:childTnLst>
-                                    <p:cmd type="call" cmd="togglePause">
-                                      <p:cBhvr additive="base">
-                                        <p:cTn id="7" dur="1" fill="hold"/>
-                                        <p:tgtEl>
-                                          <p:spTgt spid="4"/>
-                                        </p:tgtEl>
-                                      </p:cBhvr>
-                                    </p:cmd>
-                                  </p:childTnLst>
-                                </p:cTn>
-                              </p:par>
-                            </p:childTnLst>
-                          </p:cTn>
-                        </p:par>
-                      </p:childTnLst>
-                    </p:cTn>
-                  </p:par>
-                </p:childTnLst>
-              </p:cTn>
-              <p:nextCondLst>
-                <p:cond evt="onClick" delay="0">
-                  <p:tgtEl>
-                    <p:spTgt spid="4"/>
-                  </p:tgtEl>
-                </p:cond>
-              </p:nextCondLst>
-            </p:seq>
-          </p:childTnLst>
-        </p:cTn>
-      </p:par>
-    </p:tnLst>
-  </p:timing>
-</p:sld>
-</file>
-
-<file path=ppt/slides/slide12.xml><?xml version="1.0" encoding="utf-8"?>
+<file path=ppt/slides/slide13.xml><?xml version="1.0" encoding="utf-8"?>
 <p:sld xmlns:a="http://schemas.openxmlformats.org/drawingml/2006/main" xmlns:r="http://schemas.openxmlformats.org/officeDocument/2006/relationships" xmlns:p="http://schemas.openxmlformats.org/presentationml/2006/main">
   <p:cSld>
     <p:spTree>
@@ -4315,7 +5185,7 @@
 </p:sld>
 </file>
 
-<file path=ppt/slides/slide13.xml><?xml version="1.0" encoding="utf-8"?>
+<file path=ppt/slides/slide14.xml><?xml version="1.0" encoding="utf-8"?>
 <p:sld xmlns:a="http://schemas.openxmlformats.org/drawingml/2006/main" xmlns:r="http://schemas.openxmlformats.org/officeDocument/2006/relationships" xmlns:p="http://schemas.openxmlformats.org/presentationml/2006/main">
   <p:cSld>
     <p:spTree>
@@ -6045,6 +6915,357 @@
       <p:grpSpPr/>
       <p:sp>
         <p:nvSpPr>
+          <p:cNvPr id="4" name="Text Box 3"/>
+          <p:cNvSpPr txBox="true"/>
+          <p:nvPr/>
+        </p:nvSpPr>
+        <p:spPr>
+          <a:xfrm>
+            <a:off x="2014855" y="2152650"/>
+            <a:ext cx="9063355" cy="2553335"/>
+          </a:xfrm>
+          <a:prstGeom prst="rect">
+            <a:avLst/>
+          </a:prstGeom>
+          <a:noFill/>
+        </p:spPr>
+        <p:txBody>
+          <a:bodyPr wrap="square" rtlCol="0">
+            <a:spAutoFit/>
+          </a:bodyPr>
+          <a:p>
+            <a:r>
+              <a:rPr lang="zh-CN" altLang="" sz="4000">
+                <a:solidFill>
+                  <a:schemeClr val="accent1">
+                    <a:lumMod val="50000"/>
+                  </a:schemeClr>
+                </a:solidFill>
+              </a:rPr>
+              <a:t>你们最爱的视频来了，</a:t>
+            </a:r>
+            <a:endParaRPr lang="zh-CN" altLang="" sz="4000">
+              <a:solidFill>
+                <a:schemeClr val="accent1">
+                  <a:lumMod val="50000"/>
+                </a:schemeClr>
+              </a:solidFill>
+            </a:endParaRPr>
+          </a:p>
+          <a:p>
+            <a:r>
+              <a:rPr lang="zh-CN" altLang="" sz="4000">
+                <a:solidFill>
+                  <a:schemeClr val="accent1">
+                    <a:lumMod val="50000"/>
+                  </a:schemeClr>
+                </a:solidFill>
+              </a:rPr>
+              <a:t>不过先说好，</a:t>
+            </a:r>
+            <a:endParaRPr lang="zh-CN" altLang="" sz="4000">
+              <a:solidFill>
+                <a:schemeClr val="accent1">
+                  <a:lumMod val="50000"/>
+                </a:schemeClr>
+              </a:solidFill>
+            </a:endParaRPr>
+          </a:p>
+          <a:p>
+            <a:r>
+              <a:rPr lang="zh-CN" altLang="en-US" sz="4000">
+                <a:solidFill>
+                  <a:schemeClr val="accent1">
+                    <a:lumMod val="50000"/>
+                  </a:schemeClr>
+                </a:solidFill>
+              </a:rPr>
+              <a:t>你们可不能闹腾，不然最后的精彩，</a:t>
+            </a:r>
+            <a:endParaRPr lang="zh-CN" altLang="en-US" sz="4000">
+              <a:solidFill>
+                <a:schemeClr val="accent1">
+                  <a:lumMod val="50000"/>
+                </a:schemeClr>
+              </a:solidFill>
+            </a:endParaRPr>
+          </a:p>
+          <a:p>
+            <a:r>
+              <a:rPr lang="zh-CN" altLang="en-US" sz="4000">
+                <a:solidFill>
+                  <a:schemeClr val="accent1">
+                    <a:lumMod val="50000"/>
+                  </a:schemeClr>
+                </a:solidFill>
+              </a:rPr>
+              <a:t>可就要错过了！</a:t>
+            </a:r>
+            <a:endParaRPr lang="" altLang="zh-CN" sz="4000">
+              <a:solidFill>
+                <a:schemeClr val="accent1">
+                  <a:lumMod val="50000"/>
+                </a:schemeClr>
+              </a:solidFill>
+            </a:endParaRPr>
+          </a:p>
+        </p:txBody>
+      </p:sp>
+    </p:spTree>
+  </p:cSld>
+  <p:clrMapOvr>
+    <a:masterClrMapping/>
+  </p:clrMapOvr>
+  <p:transition>
+    <p:wipe/>
+  </p:transition>
+  <p:timing>
+    <p:tnLst>
+      <p:par>
+        <p:cTn id="1" dur="indefinite" restart="never" nodeType="tmRoot">
+          <p:childTnLst>
+            <p:seq concurrent="1" nextAc="seek">
+              <p:cTn id="2" dur="indefinite" nodeType="mainSeq">
+                <p:childTnLst>
+                  <p:par>
+                    <p:cTn id="3" fill="hold">
+                      <p:stCondLst>
+                        <p:cond delay="indefinite"/>
+                        <p:cond evt="onBegin" delay="0">
+                          <p:tn val="2"/>
+                        </p:cond>
+                      </p:stCondLst>
+                      <p:childTnLst>
+                        <p:par>
+                          <p:cTn id="4" fill="hold">
+                            <p:stCondLst>
+                              <p:cond delay="0"/>
+                            </p:stCondLst>
+                            <p:childTnLst>
+                              <p:par>
+                                <p:cTn id="5" presetID="24" presetClass="entr" presetSubtype="0" fill="hold" grpId="0" nodeType="afterEffect">
+                                  <p:stCondLst>
+                                    <p:cond delay="0"/>
+                                  </p:stCondLst>
+                                  <p:childTnLst>
+                                    <p:set>
+                                      <p:cBhvr>
+                                        <p:cTn id="6" dur="1" fill="hold">
+                                          <p:stCondLst>
+                                            <p:cond delay="0"/>
+                                          </p:stCondLst>
+                                        </p:cTn>
+                                        <p:tgtEl>
+                                          <p:spTgt spid="4"/>
+                                        </p:tgtEl>
+                                        <p:attrNameLst>
+                                          <p:attrName>style.visibility</p:attrName>
+                                        </p:attrNameLst>
+                                      </p:cBhvr>
+                                      <p:to>
+                                        <p:strVal val="visible"/>
+                                      </p:to>
+                                    </p:set>
+                                    <p:anim to="" calcmode="lin" valueType="num">
+                                      <p:cBhvr>
+                                        <p:cTn id="7" dur="1" fill="hold"/>
+                                        <p:tgtEl>
+                                          <p:spTgt spid="4"/>
+                                        </p:tgtEl>
+                                      </p:cBhvr>
+                                    </p:anim>
+                                  </p:childTnLst>
+                                </p:cTn>
+                              </p:par>
+                            </p:childTnLst>
+                          </p:cTn>
+                        </p:par>
+                      </p:childTnLst>
+                    </p:cTn>
+                  </p:par>
+                </p:childTnLst>
+              </p:cTn>
+              <p:prevCondLst>
+                <p:cond evt="onPrev" delay="0">
+                  <p:tgtEl>
+                    <p:sldTgt/>
+                  </p:tgtEl>
+                </p:cond>
+              </p:prevCondLst>
+              <p:nextCondLst>
+                <p:cond evt="onNext" delay="0">
+                  <p:tgtEl>
+                    <p:sldTgt/>
+                  </p:tgtEl>
+                </p:cond>
+              </p:nextCondLst>
+            </p:seq>
+          </p:childTnLst>
+        </p:cTn>
+      </p:par>
+    </p:tnLst>
+    <p:bldLst>
+      <p:bldP spid="4" grpId="0"/>
+      <p:bldP spid="4" grpId="1"/>
+    </p:bldLst>
+  </p:timing>
+</p:sld>
+</file>
+
+<file path=ppt/slides/slide6.xml><?xml version="1.0" encoding="utf-8"?>
+<p:sld xmlns:a="http://schemas.openxmlformats.org/drawingml/2006/main" xmlns:r="http://schemas.openxmlformats.org/officeDocument/2006/relationships" xmlns:p="http://schemas.openxmlformats.org/presentationml/2006/main">
+  <p:cSld>
+    <p:spTree>
+      <p:nvGrpSpPr>
+        <p:cNvPr id="1" name=""/>
+        <p:cNvGrpSpPr/>
+        <p:nvPr/>
+      </p:nvGrpSpPr>
+      <p:grpSpPr/>
+      <p:pic>
+        <p:nvPicPr>
+          <p:cNvPr id="4" name="坚持的不可能">
+            <a:hlinkClick r:id="" action="ppaction://media"/>
+          </p:cNvPr>
+          <p:cNvPicPr/>
+          <p:nvPr>
+            <p:ph idx="1"/>
+            <a:videoFile r:link="rId1"/>
+            <p:extLst>
+              <p:ext uri="{DAA4B4D4-6D71-4841-9C94-3DE7FCFB9230}">
+                <p14:media xmlns:p14="http://schemas.microsoft.com/office/powerpoint/2010/main" r:link="rId2"/>
+              </p:ext>
+            </p:extLst>
+          </p:nvPr>
+        </p:nvPicPr>
+        <p:blipFill>
+          <a:blip r:embed="rId3"/>
+          <a:stretch>
+            <a:fillRect/>
+          </a:stretch>
+        </p:blipFill>
+        <p:spPr>
+          <a:xfrm>
+            <a:off x="574040" y="668020"/>
+            <a:ext cx="11043920" cy="5522595"/>
+          </a:xfrm>
+          <a:prstGeom prst="rect">
+            <a:avLst/>
+          </a:prstGeom>
+        </p:spPr>
+      </p:pic>
+    </p:spTree>
+  </p:cSld>
+  <p:clrMapOvr>
+    <a:masterClrMapping/>
+  </p:clrMapOvr>
+  <p:timing>
+    <p:tnLst>
+      <p:par>
+        <p:cTn id="1" dur="indefinite" restart="never" nodeType="tmRoot">
+          <p:childTnLst>
+            <p:video fullScrn="false">
+              <p:cMediaNode>
+                <p:cTn id="2" fill="hold" display="1">
+                  <p:stCondLst>
+                    <p:cond delay="indefinite"/>
+                  </p:stCondLst>
+                  <p:endCondLst>
+                    <p:cond evt="onNext">
+                      <p:tgtEl>
+                        <p:sldTgt/>
+                      </p:tgtEl>
+                    </p:cond>
+                    <p:cond evt="onPrev">
+                      <p:tgtEl>
+                        <p:sldTgt/>
+                      </p:tgtEl>
+                    </p:cond>
+                  </p:endCondLst>
+                </p:cTn>
+                <p:tgtEl>
+                  <p:spTgt spid="4"/>
+                </p:tgtEl>
+              </p:cMediaNode>
+            </p:video>
+            <p:seq concurrent="1" nextAc="seek">
+              <p:cTn id="3" restart="whenNotActive" fill="hold" evtFilter="cancelBubble" nodeType="interactiveSeq">
+                <p:stCondLst>
+                  <p:cond evt="onClick" delay="0">
+                    <p:tgtEl>
+                      <p:spTgt spid="4"/>
+                    </p:tgtEl>
+                  </p:cond>
+                </p:stCondLst>
+                <p:endSync evt="end" delay="0">
+                  <p:rtn val="all"/>
+                </p:endSync>
+                <p:childTnLst>
+                  <p:par>
+                    <p:cTn id="4" fill="hold">
+                      <p:stCondLst>
+                        <p:cond delay="0"/>
+                      </p:stCondLst>
+                      <p:childTnLst>
+                        <p:par>
+                          <p:cTn id="5" fill="hold">
+                            <p:stCondLst>
+                              <p:cond delay="0"/>
+                            </p:stCondLst>
+                            <p:childTnLst>
+                              <p:par>
+                                <p:cTn id="6" presetID="2" presetClass="mediacall" presetSubtype="0" fill="hold" nodeType="clickEffect">
+                                  <p:stCondLst>
+                                    <p:cond delay="0"/>
+                                  </p:stCondLst>
+                                  <p:childTnLst>
+                                    <p:cmd type="call" cmd="togglePause">
+                                      <p:cBhvr additive="base">
+                                        <p:cTn id="7" dur="1" fill="hold"/>
+                                        <p:tgtEl>
+                                          <p:spTgt spid="4"/>
+                                        </p:tgtEl>
+                                      </p:cBhvr>
+                                    </p:cmd>
+                                  </p:childTnLst>
+                                </p:cTn>
+                              </p:par>
+                            </p:childTnLst>
+                          </p:cTn>
+                        </p:par>
+                      </p:childTnLst>
+                    </p:cTn>
+                  </p:par>
+                </p:childTnLst>
+              </p:cTn>
+              <p:nextCondLst>
+                <p:cond evt="onClick" delay="0">
+                  <p:tgtEl>
+                    <p:spTgt spid="4"/>
+                  </p:tgtEl>
+                </p:cond>
+              </p:nextCondLst>
+            </p:seq>
+          </p:childTnLst>
+        </p:cTn>
+      </p:par>
+    </p:tnLst>
+  </p:timing>
+</p:sld>
+</file>
+
+<file path=ppt/slides/slide7.xml><?xml version="1.0" encoding="utf-8"?>
+<p:sld xmlns:a="http://schemas.openxmlformats.org/drawingml/2006/main" xmlns:r="http://schemas.openxmlformats.org/officeDocument/2006/relationships" xmlns:p="http://schemas.openxmlformats.org/presentationml/2006/main">
+  <p:cSld>
+    <p:spTree>
+      <p:nvGrpSpPr>
+        <p:cNvPr id="1" name=""/>
+        <p:cNvGrpSpPr/>
+        <p:nvPr/>
+      </p:nvGrpSpPr>
+      <p:grpSpPr/>
+      <p:sp>
+        <p:nvSpPr>
           <p:cNvPr id="2" name="Title 1"/>
           <p:cNvSpPr>
             <a:spLocks noGrp="true"/>
@@ -7029,7 +8250,7 @@
 </p:sld>
 </file>
 
-<file path=ppt/slides/slide6.xml><?xml version="1.0" encoding="utf-8"?>
+<file path=ppt/slides/slide8.xml><?xml version="1.0" encoding="utf-8"?>
 <p:sld xmlns:a="http://schemas.openxmlformats.org/drawingml/2006/main" xmlns:r="http://schemas.openxmlformats.org/officeDocument/2006/relationships" xmlns:p="http://schemas.openxmlformats.org/presentationml/2006/main">
   <p:cSld>
     <p:spTree>
@@ -7501,7 +8722,7 @@
 </p:sld>
 </file>
 
-<file path=ppt/slides/slide7.xml><?xml version="1.0" encoding="utf-8"?>
+<file path=ppt/slides/slide9.xml><?xml version="1.0" encoding="utf-8"?>
 <p:sld xmlns:a="http://schemas.openxmlformats.org/drawingml/2006/main" xmlns:r="http://schemas.openxmlformats.org/officeDocument/2006/relationships" xmlns:p="http://schemas.openxmlformats.org/presentationml/2006/main">
   <p:cSld>
     <p:spTree>
@@ -7760,193 +8981,6 @@
       </p:par>
     </p:tnLst>
   </p:timing>
-</p:sld>
-</file>
-
-<file path=ppt/slides/slide8.xml><?xml version="1.0" encoding="utf-8"?>
-<p:sld xmlns:a="http://schemas.openxmlformats.org/drawingml/2006/main" xmlns:r="http://schemas.openxmlformats.org/officeDocument/2006/relationships" xmlns:p="http://schemas.openxmlformats.org/presentationml/2006/main">
-  <p:cSld>
-    <p:spTree>
-      <p:nvGrpSpPr>
-        <p:cNvPr id="1" name=""/>
-        <p:cNvGrpSpPr/>
-        <p:nvPr/>
-      </p:nvGrpSpPr>
-      <p:grpSpPr/>
-      <p:sp>
-        <p:nvSpPr>
-          <p:cNvPr id="5" name="Text Box 4"/>
-          <p:cNvSpPr txBox="true"/>
-          <p:nvPr/>
-        </p:nvSpPr>
-        <p:spPr>
-          <a:xfrm>
-            <a:off x="1099185" y="675005"/>
-            <a:ext cx="9993630" cy="5507990"/>
-          </a:xfrm>
-          <a:prstGeom prst="rect">
-            <a:avLst/>
-          </a:prstGeom>
-          <a:noFill/>
-        </p:spPr>
-        <p:txBody>
-          <a:bodyPr wrap="square" rtlCol="0">
-            <a:spAutoFit/>
-          </a:bodyPr>
-          <a:p>
-            <a:r>
-              <a:rPr lang="zh-CN" altLang="en-US" sz="3200">
-                <a:solidFill>
-                  <a:schemeClr val="accent1">
-                    <a:lumMod val="50000"/>
-                  </a:schemeClr>
-                </a:solidFill>
-              </a:rPr>
-              <a:t>狄更斯特别注意描写生活在英国社会底层的“小人物”的生活遭遇，体验生活，不管刮风下雨，每天都坚持去观察、谛听，记录下行人的零言碎语，积累了丰富的生活资料。</a:t>
-            </a:r>
-            <a:endParaRPr lang="zh-CN" altLang="en-US" sz="3200">
-              <a:solidFill>
-                <a:schemeClr val="accent1">
-                  <a:lumMod val="50000"/>
-                </a:schemeClr>
-              </a:solidFill>
-            </a:endParaRPr>
-          </a:p>
-          <a:p>
-            <a:r>
-              <a:rPr lang="zh-CN" altLang="en-US" sz="3200">
-                <a:solidFill>
-                  <a:schemeClr val="accent1">
-                    <a:lumMod val="50000"/>
-                  </a:schemeClr>
-                </a:solidFill>
-              </a:rPr>
-              <a:t>因此，他在《大卫</a:t>
-            </a:r>
-            <a:r>
-              <a:rPr lang="en-US" sz="3200">
-                <a:solidFill>
-                  <a:schemeClr val="accent1">
-                    <a:lumMod val="50000"/>
-                  </a:schemeClr>
-                </a:solidFill>
-                <a:sym typeface="+mn-ea"/>
-              </a:rPr>
-              <a:t>·</a:t>
-            </a:r>
-            <a:r>
-              <a:rPr lang="zh-CN" altLang="en-US" sz="3200">
-                <a:solidFill>
-                  <a:schemeClr val="accent1">
-                    <a:lumMod val="50000"/>
-                  </a:schemeClr>
-                </a:solidFill>
-              </a:rPr>
-              <a:t>科波菲尔》中写下精彩的人物描写对话，在《双城记》中留下逼真的社会背景描写，从而成为英国一代文豪，取得了他文学事业上的巨大成功。</a:t>
-            </a:r>
-            <a:endParaRPr lang="zh-CN" altLang="en-US" sz="3200">
-              <a:solidFill>
-                <a:schemeClr val="accent1">
-                  <a:lumMod val="50000"/>
-                </a:schemeClr>
-              </a:solidFill>
-            </a:endParaRPr>
-          </a:p>
-          <a:p>
-            <a:endParaRPr lang="zh-CN" altLang="en-US" sz="3200">
-              <a:solidFill>
-                <a:schemeClr val="accent1">
-                  <a:lumMod val="50000"/>
-                </a:schemeClr>
-              </a:solidFill>
-            </a:endParaRPr>
-          </a:p>
-          <a:p>
-            <a:r>
-              <a:rPr lang="zh-CN" altLang="en-US" sz="3200">
-                <a:solidFill>
-                  <a:schemeClr val="accent1">
-                    <a:lumMod val="50000"/>
-                  </a:schemeClr>
-                </a:solidFill>
-              </a:rPr>
-              <a:t>他的作品深刻地反映了当时英国复杂的社会现实，为英国批判现实主义文学的开拓和发展做出了卓越的贡献。他的作品对英国文学发展起到了深远的影响。</a:t>
-            </a:r>
-            <a:endParaRPr lang="zh-CN" altLang="en-US" sz="3200">
-              <a:solidFill>
-                <a:schemeClr val="accent1">
-                  <a:lumMod val="50000"/>
-                </a:schemeClr>
-              </a:solidFill>
-            </a:endParaRPr>
-          </a:p>
-        </p:txBody>
-      </p:sp>
-    </p:spTree>
-  </p:cSld>
-  <p:clrMapOvr>
-    <a:masterClrMapping/>
-  </p:clrMapOvr>
-  <p:transition>
-    <p:fade/>
-  </p:transition>
-</p:sld>
-</file>
-
-<file path=ppt/slides/slide9.xml><?xml version="1.0" encoding="utf-8"?>
-<p:sld xmlns:a="http://schemas.openxmlformats.org/drawingml/2006/main" xmlns:r="http://schemas.openxmlformats.org/officeDocument/2006/relationships" xmlns:p="http://schemas.openxmlformats.org/presentationml/2006/main">
-  <p:cSld>
-    <p:spTree>
-      <p:nvGrpSpPr>
-        <p:cNvPr id="1" name=""/>
-        <p:cNvGrpSpPr/>
-        <p:nvPr/>
-      </p:nvGrpSpPr>
-      <p:grpSpPr/>
-      <p:sp>
-        <p:nvSpPr>
-          <p:cNvPr id="4" name="Text Box 3"/>
-          <p:cNvSpPr txBox="true"/>
-          <p:nvPr/>
-        </p:nvSpPr>
-        <p:spPr>
-          <a:xfrm>
-            <a:off x="2248535" y="563880"/>
-            <a:ext cx="6062980" cy="1198880"/>
-          </a:xfrm>
-          <a:prstGeom prst="rect">
-            <a:avLst/>
-          </a:prstGeom>
-          <a:noFill/>
-        </p:spPr>
-        <p:txBody>
-          <a:bodyPr wrap="square" rtlCol="0">
-            <a:spAutoFit/>
-          </a:bodyPr>
-          <a:p>
-            <a:r>
-              <a:rPr lang="zh-CN" altLang="en-US" sz="3600"/>
-              <a:t>可是这好像都里我们很远，</a:t>
-            </a:r>
-            <a:endParaRPr lang="zh-CN" altLang="en-US" sz="3600"/>
-          </a:p>
-          <a:p>
-            <a:r>
-              <a:rPr lang="zh-CN" altLang="en-US" sz="3600"/>
-              <a:t>我们也没有这么</a:t>
-            </a:r>
-            <a:endParaRPr lang="zh-CN" altLang="en-US" sz="3600"/>
-          </a:p>
-        </p:txBody>
-      </p:sp>
-    </p:spTree>
-  </p:cSld>
-  <p:clrMapOvr>
-    <a:masterClrMapping/>
-  </p:clrMapOvr>
-  <p:transition>
-    <p:fade/>
-  </p:transition>
 </p:sld>
 </file>
 
@@ -8201,6 +9235,21 @@
       </a:bgFillStyleLst>
     </a:fmtScheme>
   </a:themeElements>
+  <a:objectDefaults>
+    <a:txDef>
+      <a:spPr>
+        <a:noFill/>
+      </a:spPr>
+      <a:bodyPr wrap="square" rtlCol="0">
+        <a:spAutoFit/>
+      </a:bodyPr>
+      <a:lstStyle>
+        <a:defPPr>
+          <a:defRPr lang="zh-CN" altLang="" sz="4000"/>
+        </a:defPPr>
+      </a:lstStyle>
+    </a:txDef>
+  </a:objectDefaults>
   <a:extLst>
     <a:ext uri="{05A4C25C-085E-4340-85A3-A5531E510DB2}">
       <thm15:themeFamily xmlns:thm15="http://schemas.microsoft.com/office/thememl/2012/main" name="Office Theme" id="{62F939B6-93AF-4DB8-9C6B-D6C7DFDC589F}" vid="{4A3C46E8-61CC-4603-A589-7422A47A8E4A}"/>

</xml_diff>